<commit_message>
adapt to exercise CRUD update
</commit_message>
<xml_diff>
--- a/public/cursus/web-backend-uitdieping.pptx
+++ b/public/cursus/web-backend-uitdieping.pptx
@@ -513,7 +513,7 @@
           <a:p>
             <a:fld id="{3318FCAA-0CEF-449C-97DC-B718C310AD9E}" type="datetimeFigureOut">
               <a:rPr lang="nl-BE" smtClean="0"/>
-              <a:t>3/10/2014</a:t>
+              <a:t>6/10/2014</a:t>
             </a:fld>
             <a:endParaRPr lang="nl-BE"/>
           </a:p>
@@ -3210,7 +3210,7 @@
           <a:p>
             <a:fld id="{DBD1D86F-8E35-4AFA-A51D-7D940D7F1775}" type="datetimeFigureOut">
               <a:rPr lang="nl-BE" smtClean="0"/>
-              <a:t>3/10/2014</a:t>
+              <a:t>6/10/2014</a:t>
             </a:fld>
             <a:endParaRPr lang="nl-BE"/>
           </a:p>
@@ -3380,7 +3380,7 @@
           <a:p>
             <a:fld id="{DBD1D86F-8E35-4AFA-A51D-7D940D7F1775}" type="datetimeFigureOut">
               <a:rPr lang="nl-BE" smtClean="0"/>
-              <a:t>3/10/2014</a:t>
+              <a:t>6/10/2014</a:t>
             </a:fld>
             <a:endParaRPr lang="nl-BE"/>
           </a:p>
@@ -3560,7 +3560,7 @@
           <a:p>
             <a:fld id="{DBD1D86F-8E35-4AFA-A51D-7D940D7F1775}" type="datetimeFigureOut">
               <a:rPr lang="nl-BE" smtClean="0"/>
-              <a:t>3/10/2014</a:t>
+              <a:t>6/10/2014</a:t>
             </a:fld>
             <a:endParaRPr lang="nl-BE"/>
           </a:p>
@@ -3730,7 +3730,7 @@
           <a:p>
             <a:fld id="{DBD1D86F-8E35-4AFA-A51D-7D940D7F1775}" type="datetimeFigureOut">
               <a:rPr lang="nl-BE" smtClean="0"/>
-              <a:t>3/10/2014</a:t>
+              <a:t>6/10/2014</a:t>
             </a:fld>
             <a:endParaRPr lang="nl-BE"/>
           </a:p>
@@ -3976,7 +3976,7 @@
           <a:p>
             <a:fld id="{DBD1D86F-8E35-4AFA-A51D-7D940D7F1775}" type="datetimeFigureOut">
               <a:rPr lang="nl-BE" smtClean="0"/>
-              <a:t>3/10/2014</a:t>
+              <a:t>6/10/2014</a:t>
             </a:fld>
             <a:endParaRPr lang="nl-BE"/>
           </a:p>
@@ -4264,7 +4264,7 @@
           <a:p>
             <a:fld id="{DBD1D86F-8E35-4AFA-A51D-7D940D7F1775}" type="datetimeFigureOut">
               <a:rPr lang="nl-BE" smtClean="0"/>
-              <a:t>3/10/2014</a:t>
+              <a:t>6/10/2014</a:t>
             </a:fld>
             <a:endParaRPr lang="nl-BE"/>
           </a:p>
@@ -4686,7 +4686,7 @@
           <a:p>
             <a:fld id="{DBD1D86F-8E35-4AFA-A51D-7D940D7F1775}" type="datetimeFigureOut">
               <a:rPr lang="nl-BE" smtClean="0"/>
-              <a:t>3/10/2014</a:t>
+              <a:t>6/10/2014</a:t>
             </a:fld>
             <a:endParaRPr lang="nl-BE"/>
           </a:p>
@@ -4804,7 +4804,7 @@
           <a:p>
             <a:fld id="{DBD1D86F-8E35-4AFA-A51D-7D940D7F1775}" type="datetimeFigureOut">
               <a:rPr lang="nl-BE" smtClean="0"/>
-              <a:t>3/10/2014</a:t>
+              <a:t>6/10/2014</a:t>
             </a:fld>
             <a:endParaRPr lang="nl-BE"/>
           </a:p>
@@ -4899,7 +4899,7 @@
           <a:p>
             <a:fld id="{DBD1D86F-8E35-4AFA-A51D-7D940D7F1775}" type="datetimeFigureOut">
               <a:rPr lang="nl-BE" smtClean="0"/>
-              <a:t>3/10/2014</a:t>
+              <a:t>6/10/2014</a:t>
             </a:fld>
             <a:endParaRPr lang="nl-BE"/>
           </a:p>
@@ -5176,7 +5176,7 @@
           <a:p>
             <a:fld id="{DBD1D86F-8E35-4AFA-A51D-7D940D7F1775}" type="datetimeFigureOut">
               <a:rPr lang="nl-BE" smtClean="0"/>
-              <a:t>3/10/2014</a:t>
+              <a:t>6/10/2014</a:t>
             </a:fld>
             <a:endParaRPr lang="nl-BE"/>
           </a:p>
@@ -5429,7 +5429,7 @@
           <a:p>
             <a:fld id="{DBD1D86F-8E35-4AFA-A51D-7D940D7F1775}" type="datetimeFigureOut">
               <a:rPr lang="nl-BE" smtClean="0"/>
-              <a:t>3/10/2014</a:t>
+              <a:t>6/10/2014</a:t>
             </a:fld>
             <a:endParaRPr lang="nl-BE"/>
           </a:p>
@@ -5642,7 +5642,7 @@
           <a:p>
             <a:fld id="{DBD1D86F-8E35-4AFA-A51D-7D940D7F1775}" type="datetimeFigureOut">
               <a:rPr lang="nl-BE" smtClean="0"/>
-              <a:t>3/10/2014</a:t>
+              <a:t>6/10/2014</a:t>
             </a:fld>
             <a:endParaRPr lang="nl-BE"/>
           </a:p>
@@ -42223,21 +42223,18 @@
               <a:t>: </a:t>
             </a:r>
             <a:r>
-              <a:rPr lang="nl-BE" dirty="0" err="1" smtClean="0">
+              <a:rPr lang="nl-BE" dirty="0" smtClean="0">
                 <a:solidFill>
                   <a:srgbClr val="00B0F0"/>
                 </a:solidFill>
               </a:rPr>
-              <a:t>opdrach</a:t>
-            </a:r>
-            <a:r>
-              <a:rPr lang="nl-BE" dirty="0" smtClean="0">
-                <a:solidFill>
-                  <a:srgbClr val="00B0F0"/>
-                </a:solidFill>
-              </a:rPr>
-              <a:t>-CRUD-delete </a:t>
-            </a:r>
+              <a:t>opdracht-CRUD-delete </a:t>
+            </a:r>
+            <a:endParaRPr lang="nl-BE" dirty="0" smtClean="0">
+              <a:solidFill>
+                <a:srgbClr val="00B0F0"/>
+              </a:solidFill>
+            </a:endParaRPr>
           </a:p>
           <a:p>
             <a:pPr>
@@ -42257,24 +42254,29 @@
               <a:t>Opdracht</a:t>
             </a:r>
             <a:r>
-              <a:rPr lang="nl-BE" dirty="0" smtClean="0">
+              <a:rPr lang="nl-BE" smtClean="0">
                 <a:solidFill>
                   <a:srgbClr val="00B0F0"/>
                 </a:solidFill>
               </a:rPr>
-              <a:t>: phpoefening026.pdf </a:t>
-            </a:r>
-            <a:r>
-              <a:rPr lang="nl-BE" dirty="0" smtClean="0">
-                <a:solidFill>
-                  <a:schemeClr val="tx1">
-                    <a:lumMod val="95000"/>
-                    <a:lumOff val="5000"/>
-                  </a:schemeClr>
-                </a:solidFill>
-              </a:rPr>
-              <a:t>(update)</a:t>
-            </a:r>
+              <a:t>: </a:t>
+            </a:r>
+            <a:r>
+              <a:rPr lang="nl-BE" smtClean="0">
+                <a:solidFill>
+                  <a:srgbClr val="00B0F0"/>
+                </a:solidFill>
+              </a:rPr>
+              <a:t>opdracht-CRUD-update</a:t>
+            </a:r>
+            <a:endParaRPr lang="nl-BE" dirty="0" smtClean="0">
+              <a:solidFill>
+                <a:schemeClr val="tx1">
+                  <a:lumMod val="95000"/>
+                  <a:lumOff val="5000"/>
+                </a:schemeClr>
+              </a:solidFill>
+            </a:endParaRPr>
           </a:p>
           <a:p>
             <a:pPr>

</xml_diff>

<commit_message>
add opdracht, update slides
</commit_message>
<xml_diff>
--- a/public/cursus/web-backend-uitdieping.pptx
+++ b/public/cursus/web-backend-uitdieping.pptx
@@ -513,7 +513,7 @@
           <a:p>
             <a:fld id="{3318FCAA-0CEF-449C-97DC-B718C310AD9E}" type="datetimeFigureOut">
               <a:rPr lang="nl-BE" smtClean="0"/>
-              <a:t>6/10/2014</a:t>
+              <a:t>9/10/2014</a:t>
             </a:fld>
             <a:endParaRPr lang="nl-BE"/>
           </a:p>
@@ -3210,7 +3210,7 @@
           <a:p>
             <a:fld id="{DBD1D86F-8E35-4AFA-A51D-7D940D7F1775}" type="datetimeFigureOut">
               <a:rPr lang="nl-BE" smtClean="0"/>
-              <a:t>6/10/2014</a:t>
+              <a:t>9/10/2014</a:t>
             </a:fld>
             <a:endParaRPr lang="nl-BE"/>
           </a:p>
@@ -3380,7 +3380,7 @@
           <a:p>
             <a:fld id="{DBD1D86F-8E35-4AFA-A51D-7D940D7F1775}" type="datetimeFigureOut">
               <a:rPr lang="nl-BE" smtClean="0"/>
-              <a:t>6/10/2014</a:t>
+              <a:t>9/10/2014</a:t>
             </a:fld>
             <a:endParaRPr lang="nl-BE"/>
           </a:p>
@@ -3560,7 +3560,7 @@
           <a:p>
             <a:fld id="{DBD1D86F-8E35-4AFA-A51D-7D940D7F1775}" type="datetimeFigureOut">
               <a:rPr lang="nl-BE" smtClean="0"/>
-              <a:t>6/10/2014</a:t>
+              <a:t>9/10/2014</a:t>
             </a:fld>
             <a:endParaRPr lang="nl-BE"/>
           </a:p>
@@ -3730,7 +3730,7 @@
           <a:p>
             <a:fld id="{DBD1D86F-8E35-4AFA-A51D-7D940D7F1775}" type="datetimeFigureOut">
               <a:rPr lang="nl-BE" smtClean="0"/>
-              <a:t>6/10/2014</a:t>
+              <a:t>9/10/2014</a:t>
             </a:fld>
             <a:endParaRPr lang="nl-BE"/>
           </a:p>
@@ -3976,7 +3976,7 @@
           <a:p>
             <a:fld id="{DBD1D86F-8E35-4AFA-A51D-7D940D7F1775}" type="datetimeFigureOut">
               <a:rPr lang="nl-BE" smtClean="0"/>
-              <a:t>6/10/2014</a:t>
+              <a:t>9/10/2014</a:t>
             </a:fld>
             <a:endParaRPr lang="nl-BE"/>
           </a:p>
@@ -4264,7 +4264,7 @@
           <a:p>
             <a:fld id="{DBD1D86F-8E35-4AFA-A51D-7D940D7F1775}" type="datetimeFigureOut">
               <a:rPr lang="nl-BE" smtClean="0"/>
-              <a:t>6/10/2014</a:t>
+              <a:t>9/10/2014</a:t>
             </a:fld>
             <a:endParaRPr lang="nl-BE"/>
           </a:p>
@@ -4686,7 +4686,7 @@
           <a:p>
             <a:fld id="{DBD1D86F-8E35-4AFA-A51D-7D940D7F1775}" type="datetimeFigureOut">
               <a:rPr lang="nl-BE" smtClean="0"/>
-              <a:t>6/10/2014</a:t>
+              <a:t>9/10/2014</a:t>
             </a:fld>
             <a:endParaRPr lang="nl-BE"/>
           </a:p>
@@ -4804,7 +4804,7 @@
           <a:p>
             <a:fld id="{DBD1D86F-8E35-4AFA-A51D-7D940D7F1775}" type="datetimeFigureOut">
               <a:rPr lang="nl-BE" smtClean="0"/>
-              <a:t>6/10/2014</a:t>
+              <a:t>9/10/2014</a:t>
             </a:fld>
             <a:endParaRPr lang="nl-BE"/>
           </a:p>
@@ -4899,7 +4899,7 @@
           <a:p>
             <a:fld id="{DBD1D86F-8E35-4AFA-A51D-7D940D7F1775}" type="datetimeFigureOut">
               <a:rPr lang="nl-BE" smtClean="0"/>
-              <a:t>6/10/2014</a:t>
+              <a:t>9/10/2014</a:t>
             </a:fld>
             <a:endParaRPr lang="nl-BE"/>
           </a:p>
@@ -5176,7 +5176,7 @@
           <a:p>
             <a:fld id="{DBD1D86F-8E35-4AFA-A51D-7D940D7F1775}" type="datetimeFigureOut">
               <a:rPr lang="nl-BE" smtClean="0"/>
-              <a:t>6/10/2014</a:t>
+              <a:t>9/10/2014</a:t>
             </a:fld>
             <a:endParaRPr lang="nl-BE"/>
           </a:p>
@@ -5429,7 +5429,7 @@
           <a:p>
             <a:fld id="{DBD1D86F-8E35-4AFA-A51D-7D940D7F1775}" type="datetimeFigureOut">
               <a:rPr lang="nl-BE" smtClean="0"/>
-              <a:t>6/10/2014</a:t>
+              <a:t>9/10/2014</a:t>
             </a:fld>
             <a:endParaRPr lang="nl-BE"/>
           </a:p>
@@ -5642,7 +5642,7 @@
           <a:p>
             <a:fld id="{DBD1D86F-8E35-4AFA-A51D-7D940D7F1775}" type="datetimeFigureOut">
               <a:rPr lang="nl-BE" smtClean="0"/>
-              <a:t>6/10/2014</a:t>
+              <a:t>9/10/2014</a:t>
             </a:fld>
             <a:endParaRPr lang="nl-BE"/>
           </a:p>
@@ -42230,11 +42230,6 @@
               </a:rPr>
               <a:t>opdracht-CRUD-delete </a:t>
             </a:r>
-            <a:endParaRPr lang="nl-BE" dirty="0" smtClean="0">
-              <a:solidFill>
-                <a:srgbClr val="00B0F0"/>
-              </a:solidFill>
-            </a:endParaRPr>
           </a:p>
           <a:p>
             <a:pPr>
@@ -42254,20 +42249,12 @@
               <a:t>Opdracht</a:t>
             </a:r>
             <a:r>
-              <a:rPr lang="nl-BE" smtClean="0">
+              <a:rPr lang="nl-BE" dirty="0" smtClean="0">
                 <a:solidFill>
                   <a:srgbClr val="00B0F0"/>
                 </a:solidFill>
               </a:rPr>
-              <a:t>: </a:t>
-            </a:r>
-            <a:r>
-              <a:rPr lang="nl-BE" smtClean="0">
-                <a:solidFill>
-                  <a:srgbClr val="00B0F0"/>
-                </a:solidFill>
-              </a:rPr>
-              <a:t>opdracht-CRUD-update</a:t>
+              <a:t>: opdracht-CRUD-update</a:t>
             </a:r>
             <a:endParaRPr lang="nl-BE" dirty="0" smtClean="0">
               <a:solidFill>
@@ -42301,29 +42288,23 @@
                   <a:srgbClr val="00B0F0"/>
                 </a:solidFill>
               </a:rPr>
-              <a:t>: phpoefening027.pdf </a:t>
-            </a:r>
-            <a:r>
-              <a:rPr lang="nl-BE" dirty="0">
-                <a:solidFill>
-                  <a:schemeClr val="tx1">
-                    <a:lumMod val="95000"/>
-                    <a:lumOff val="5000"/>
-                  </a:schemeClr>
-                </a:solidFill>
-              </a:rPr>
-              <a:t>(order by</a:t>
+              <a:t>: </a:t>
             </a:r>
             <a:r>
               <a:rPr lang="nl-BE" dirty="0" smtClean="0">
                 <a:solidFill>
-                  <a:schemeClr val="tx1">
-                    <a:lumMod val="95000"/>
-                    <a:lumOff val="5000"/>
-                  </a:schemeClr>
-                </a:solidFill>
-              </a:rPr>
-              <a:t>)</a:t>
+                  <a:srgbClr val="00B0F0"/>
+                </a:solidFill>
+              </a:rPr>
+              <a:t>opdracht-CRUD-query-order-</a:t>
+            </a:r>
+            <a:r>
+              <a:rPr lang="nl-BE" smtClean="0">
+                <a:solidFill>
+                  <a:srgbClr val="00B0F0"/>
+                </a:solidFill>
+              </a:rPr>
+              <a:t>by</a:t>
             </a:r>
             <a:endParaRPr lang="nl-BE" dirty="0">
               <a:solidFill>

</xml_diff>

<commit_message>
add security login exercise
</commit_message>
<xml_diff>
--- a/public/cursus/web-backend-uitdieping.pptx
+++ b/public/cursus/web-backend-uitdieping.pptx
@@ -45840,7 +45840,7 @@
         <p:spPr/>
         <p:txBody>
           <a:bodyPr>
-            <a:normAutofit lnSpcReduction="10000"/>
+            <a:normAutofit fontScale="92500" lnSpcReduction="20000"/>
           </a:bodyPr>
           <a:lstStyle/>
           <a:p>
@@ -45990,7 +45990,38 @@
             </a:r>
             <a:r>
               <a:rPr lang="nl-BE" dirty="0" smtClean="0"/>
-              <a:t> statements</a:t>
+              <a:t> </a:t>
+            </a:r>
+            <a:r>
+              <a:rPr lang="nl-BE" dirty="0" smtClean="0"/>
+              <a:t>statements</a:t>
+            </a:r>
+            <a:br>
+              <a:rPr lang="nl-BE" dirty="0" smtClean="0"/>
+            </a:br>
+            <a:endParaRPr lang="nl-BE" dirty="0" smtClean="0"/>
+          </a:p>
+          <a:p>
+            <a:pPr lvl="1"/>
+            <a:r>
+              <a:rPr lang="nl-BE" dirty="0"/>
+              <a:t>Opdracht</a:t>
+            </a:r>
+            <a:r>
+              <a:rPr lang="nl-BE"/>
+              <a:t>: </a:t>
+            </a:r>
+            <a:r>
+              <a:rPr lang="nl-BE" smtClean="0">
+                <a:solidFill>
+                  <a:srgbClr val="00B0F0"/>
+                </a:solidFill>
+              </a:rPr>
+              <a:t>opdracht-security-login</a:t>
+            </a:r>
+            <a:r>
+              <a:rPr lang="nl-BE" dirty="0" smtClean="0"/>
+              <a:t/>
             </a:r>
             <a:br>
               <a:rPr lang="nl-BE" dirty="0" smtClean="0"/>

</xml_diff>